<commit_message>
JAVA와 hadoop 연동 jar파일
</commit_message>
<xml_diff>
--- a/R programming/개념설명도.pptx
+++ b/R programming/개념설명도.pptx
@@ -5800,6 +5800,68 @@
           </a:fontRef>
         </p:style>
       </p:cxnSp>
+      <p:sp>
+        <p:nvSpPr>
+          <p:cNvPr id="33" name="직사각형 32"/>
+          <p:cNvSpPr/>
+          <p:nvPr/>
+        </p:nvSpPr>
+        <p:spPr>
+          <a:xfrm>
+            <a:off x="3931145" y="806971"/>
+            <a:ext cx="2336961" cy="301655"/>
+          </a:xfrm>
+          <a:prstGeom prst="rect">
+            <a:avLst/>
+          </a:prstGeom>
+          <a:noFill/>
+          <a:ln>
+            <a:noFill/>
+          </a:ln>
+        </p:spPr>
+        <p:style>
+          <a:lnRef idx="1">
+            <a:schemeClr val="accent5"/>
+          </a:lnRef>
+          <a:fillRef idx="3">
+            <a:schemeClr val="accent5"/>
+          </a:fillRef>
+          <a:effectRef idx="2">
+            <a:schemeClr val="accent5"/>
+          </a:effectRef>
+          <a:fontRef idx="minor">
+            <a:schemeClr val="lt1"/>
+          </a:fontRef>
+        </p:style>
+        <p:txBody>
+          <a:bodyPr rtlCol="0" anchor="ctr"/>
+          <a:lstStyle/>
+          <a:p>
+            <a:pPr algn="ctr"/>
+            <a:r>
+              <a:rPr lang="en-US" altLang="ko-KR" dirty="0" smtClean="0">
+                <a:solidFill>
+                  <a:schemeClr val="tx1"/>
+                </a:solidFill>
+              </a:rPr>
+              <a:t>JDBC</a:t>
+            </a:r>
+            <a:r>
+              <a:rPr lang="ko-KR" altLang="en-US" dirty="0" smtClean="0">
+                <a:solidFill>
+                  <a:schemeClr val="tx1"/>
+                </a:solidFill>
+              </a:rPr>
+              <a:t>를 통해 들어감</a:t>
+            </a:r>
+            <a:endParaRPr lang="ko-KR" altLang="en-US" dirty="0">
+              <a:solidFill>
+                <a:schemeClr val="tx1"/>
+              </a:solidFill>
+            </a:endParaRPr>
+          </a:p>
+        </p:txBody>
+      </p:sp>
     </p:spTree>
     <p:extLst>
       <p:ext uri="{BB962C8B-B14F-4D97-AF65-F5344CB8AC3E}">

</xml_diff>